<commit_message>
Increased the font size.
</commit_message>
<xml_diff>
--- a/GDP.pptx
+++ b/GDP.pptx
@@ -6089,10 +6089,10 @@
               <a:buNone/>
             </a:pPr>
             <a:r>
-              <a:rPr lang="en"/>
+              <a:rPr lang="en" sz="3200" dirty="0"/>
               <a:t>Enhanced Features</a:t>
             </a:r>
-            <a:endParaRPr/>
+            <a:endParaRPr sz="3200" dirty="0"/>
           </a:p>
         </p:txBody>
       </p:sp>
@@ -6132,10 +6132,10 @@
               <a:buChar char="•"/>
             </a:pPr>
             <a:r>
-              <a:rPr lang="en" dirty="0"/>
+              <a:rPr lang="en" sz="2400" dirty="0"/>
               <a:t>Redefining new tasks for updating.</a:t>
             </a:r>
-            <a:endParaRPr dirty="0"/>
+            <a:endParaRPr sz="2400" dirty="0"/>
           </a:p>
           <a:p>
             <a:pPr marL="285750" lvl="0" indent="-285750" algn="l" rtl="0">
@@ -6149,10 +6149,10 @@
               <a:buChar char="•"/>
             </a:pPr>
             <a:r>
-              <a:rPr lang="en" dirty="0"/>
+              <a:rPr lang="en" sz="2400" dirty="0"/>
               <a:t>Collab with google maps API, and step count apps.</a:t>
             </a:r>
-            <a:endParaRPr dirty="0"/>
+            <a:endParaRPr sz="2400" dirty="0"/>
           </a:p>
           <a:p>
             <a:pPr marL="285750" lvl="0" indent="-285750" algn="l" rtl="0">
@@ -6166,10 +6166,10 @@
               <a:buChar char="•"/>
             </a:pPr>
             <a:r>
-              <a:rPr lang="en" dirty="0"/>
+              <a:rPr lang="en" sz="2400" dirty="0"/>
               <a:t>Adding group challenges as well as setting up user challenge creation.</a:t>
             </a:r>
-            <a:endParaRPr dirty="0"/>
+            <a:endParaRPr sz="2400" dirty="0"/>
           </a:p>
           <a:p>
             <a:pPr marL="0" lvl="0" indent="0" algn="l" rtl="0">
@@ -6221,6 +6221,10 @@
           </p:nvPr>
         </p:nvSpPr>
         <p:spPr>
+          <a:xfrm>
+            <a:off x="311700" y="288275"/>
+            <a:ext cx="8520600" cy="572700"/>
+          </a:xfrm>
           <a:prstGeom prst="rect">
             <a:avLst/>
           </a:prstGeom>
@@ -6241,10 +6245,10 @@
               <a:buNone/>
             </a:pPr>
             <a:r>
-              <a:rPr lang="en"/>
+              <a:rPr lang="en" sz="3200" dirty="0"/>
               <a:t>References</a:t>
             </a:r>
-            <a:endParaRPr/>
+            <a:endParaRPr sz="3200" dirty="0"/>
           </a:p>
         </p:txBody>
       </p:sp>
@@ -6287,7 +6291,7 @@
               <a:buChar char="•"/>
             </a:pPr>
             <a:r>
-              <a:rPr lang="en" sz="2000" dirty="0">
+              <a:rPr lang="en" sz="2400" dirty="0">
                 <a:solidFill>
                   <a:srgbClr val="474B57"/>
                 </a:solidFill>
@@ -6295,7 +6299,7 @@
               <a:t>Original RFP: </a:t>
             </a:r>
             <a:r>
-              <a:rPr lang="en" sz="2000" u="sng" dirty="0">
+              <a:rPr lang="en" sz="2400" u="sng" dirty="0">
                 <a:solidFill>
                   <a:schemeClr val="hlink"/>
                 </a:solidFill>
@@ -6303,7 +6307,7 @@
               </a:rPr>
               <a:t>https://github.com/cbadami/rfp-health-and-wellness</a:t>
             </a:r>
-            <a:endParaRPr sz="2000" dirty="0">
+            <a:endParaRPr sz="2400" dirty="0">
               <a:solidFill>
                 <a:srgbClr val="474B57"/>
               </a:solidFill>
@@ -6328,7 +6332,7 @@
               <a:buChar char="•"/>
             </a:pPr>
             <a:r>
-              <a:rPr lang="en" sz="2000" dirty="0">
+              <a:rPr lang="en" sz="2400" dirty="0">
                 <a:solidFill>
                   <a:srgbClr val="474B57"/>
                 </a:solidFill>
@@ -6336,7 +6340,7 @@
               <a:t>Link to group repository: </a:t>
             </a:r>
             <a:r>
-              <a:rPr lang="en" sz="2000" u="sng" dirty="0">
+              <a:rPr lang="en" sz="2400" u="sng" dirty="0">
                 <a:solidFill>
                   <a:schemeClr val="hlink"/>
                 </a:solidFill>
@@ -6344,7 +6348,7 @@
               </a:rPr>
               <a:t>https://github.com/annie0sc/gdp_group4</a:t>
             </a:r>
-            <a:endParaRPr sz="2000" dirty="0">
+            <a:endParaRPr sz="2400" dirty="0">
               <a:solidFill>
                 <a:srgbClr val="474B57"/>
               </a:solidFill>
@@ -6366,7 +6370,7 @@
               <a:buChar char="•"/>
             </a:pPr>
             <a:r>
-              <a:rPr lang="en" sz="2000" dirty="0">
+              <a:rPr lang="en" sz="2400" dirty="0">
                 <a:solidFill>
                   <a:srgbClr val="474B57"/>
                 </a:solidFill>
@@ -6374,7 +6378,7 @@
               <a:t>Link to the published site: </a:t>
             </a:r>
             <a:r>
-              <a:rPr lang="en" sz="2000" u="sng" dirty="0">
+              <a:rPr lang="en" sz="2400" u="sng" dirty="0">
                 <a:solidFill>
                   <a:schemeClr val="hlink"/>
                 </a:solidFill>
@@ -6382,7 +6386,7 @@
               </a:rPr>
               <a:t>https://annie0sc.github.io/gdp_group4/</a:t>
             </a:r>
-            <a:endParaRPr sz="2000" dirty="0">
+            <a:endParaRPr sz="2400" dirty="0">
               <a:solidFill>
                 <a:srgbClr val="474B57"/>
               </a:solidFill>
@@ -6729,10 +6733,10 @@
               <a:buNone/>
             </a:pPr>
             <a:r>
-              <a:rPr lang="en"/>
+              <a:rPr lang="en" sz="3200" dirty="0"/>
               <a:t>Overview</a:t>
             </a:r>
-            <a:endParaRPr/>
+            <a:endParaRPr sz="3200" dirty="0"/>
           </a:p>
         </p:txBody>
       </p:sp>
@@ -6769,10 +6773,10 @@
               <a:buChar char="•"/>
             </a:pPr>
             <a:r>
-              <a:rPr lang="en" sz="1200" dirty="0"/>
+              <a:rPr lang="en" sz="1600" dirty="0"/>
               <a:t>Using this app, the user can monitor their activity and understand how they can improve or manage daily activities. </a:t>
             </a:r>
-            <a:endParaRPr sz="1200" dirty="0"/>
+            <a:endParaRPr sz="1600" dirty="0"/>
           </a:p>
           <a:p>
             <a:pPr marL="171450" lvl="0" indent="-171450" algn="l" rtl="0">
@@ -6790,10 +6794,10 @@
               <a:buChar char="•"/>
             </a:pPr>
             <a:r>
-              <a:rPr lang="en" sz="1200" dirty="0"/>
+              <a:rPr lang="en" sz="1600" dirty="0"/>
               <a:t>With this app, users can set goals they want to reach, such as losing or gaining weight. To let users monitor their eating habits, apps of this type should have a food logging feature.</a:t>
             </a:r>
-            <a:endParaRPr sz="1200" dirty="0"/>
+            <a:endParaRPr sz="1600" dirty="0"/>
           </a:p>
           <a:p>
             <a:pPr marL="171450" lvl="0" indent="-171450" algn="l" rtl="0">
@@ -6808,10 +6812,10 @@
               <a:buChar char="•"/>
             </a:pPr>
             <a:r>
-              <a:rPr lang="en" sz="1200" dirty="0"/>
+              <a:rPr lang="en" sz="1600" dirty="0"/>
               <a:t>Every user can set a personal goal for each activity and see if they can reach it or not.</a:t>
             </a:r>
-            <a:endParaRPr sz="1200" dirty="0"/>
+            <a:endParaRPr sz="1600" dirty="0"/>
           </a:p>
           <a:p>
             <a:pPr marL="171450" lvl="0" indent="-171450" algn="l" rtl="0">
@@ -6826,10 +6830,10 @@
               <a:buChar char="•"/>
             </a:pPr>
             <a:r>
-              <a:rPr lang="en" sz="1200" dirty="0"/>
+              <a:rPr lang="en" sz="1600" dirty="0"/>
               <a:t> They can accept challenges created by admins and also can create their own challenge among their friends or groups.</a:t>
             </a:r>
-            <a:endParaRPr sz="1200" dirty="0"/>
+            <a:endParaRPr sz="1600" dirty="0"/>
           </a:p>
           <a:p>
             <a:pPr marL="0" lvl="0" indent="0" algn="l" rtl="0">
@@ -6888,6 +6892,10 @@
           </p:nvPr>
         </p:nvSpPr>
         <p:spPr>
+          <a:xfrm>
+            <a:off x="311700" y="430848"/>
+            <a:ext cx="1949491" cy="572700"/>
+          </a:xfrm>
           <a:prstGeom prst="rect">
             <a:avLst/>
           </a:prstGeom>
@@ -6931,8 +6939,8 @@
         </p:blipFill>
         <p:spPr>
           <a:xfrm>
-            <a:off x="1862275" y="1152475"/>
-            <a:ext cx="2174450" cy="3675850"/>
+            <a:off x="2946059" y="430848"/>
+            <a:ext cx="2568694" cy="4373563"/>
           </a:xfrm>
           <a:prstGeom prst="rect">
             <a:avLst/>
@@ -6959,8 +6967,8 @@
         </p:blipFill>
         <p:spPr>
           <a:xfrm>
-            <a:off x="5062775" y="1145025"/>
-            <a:ext cx="2174450" cy="3659386"/>
+            <a:off x="5951526" y="402494"/>
+            <a:ext cx="2568694" cy="4373564"/>
           </a:xfrm>
           <a:prstGeom prst="rect">
             <a:avLst/>
@@ -7007,6 +7015,10 @@
           </p:nvPr>
         </p:nvSpPr>
         <p:spPr>
+          <a:xfrm>
+            <a:off x="311700" y="430848"/>
+            <a:ext cx="1864430" cy="572700"/>
+          </a:xfrm>
           <a:prstGeom prst="rect">
             <a:avLst/>
           </a:prstGeom>
@@ -7050,8 +7062,8 @@
         </p:blipFill>
         <p:spPr>
           <a:xfrm>
-            <a:off x="1777500" y="1028250"/>
-            <a:ext cx="2546525" cy="3812701"/>
+            <a:off x="2663546" y="431279"/>
+            <a:ext cx="2546525" cy="4280941"/>
           </a:xfrm>
           <a:prstGeom prst="rect">
             <a:avLst/>
@@ -7078,8 +7090,8 @@
         </p:blipFill>
         <p:spPr>
           <a:xfrm>
-            <a:off x="5181325" y="1017725"/>
-            <a:ext cx="2546525" cy="3799600"/>
+            <a:off x="5854721" y="430848"/>
+            <a:ext cx="2546525" cy="4414830"/>
           </a:xfrm>
           <a:prstGeom prst="rect">
             <a:avLst/>
@@ -7126,6 +7138,10 @@
           </p:nvPr>
         </p:nvSpPr>
         <p:spPr>
+          <a:xfrm>
+            <a:off x="311701" y="430849"/>
+            <a:ext cx="1899872" cy="572700"/>
+          </a:xfrm>
           <a:prstGeom prst="rect">
             <a:avLst/>
           </a:prstGeom>
@@ -7169,8 +7185,8 @@
         </p:blipFill>
         <p:spPr>
           <a:xfrm>
-            <a:off x="5042250" y="1041537"/>
-            <a:ext cx="2661700" cy="3806438"/>
+            <a:off x="5914119" y="452142"/>
+            <a:ext cx="2661700" cy="4295082"/>
           </a:xfrm>
           <a:prstGeom prst="rect">
             <a:avLst/>
@@ -7197,8 +7213,8 @@
         </p:blipFill>
         <p:spPr>
           <a:xfrm>
-            <a:off x="1260675" y="1017725"/>
-            <a:ext cx="2661700" cy="3835825"/>
+            <a:off x="2731996" y="452143"/>
+            <a:ext cx="2661700" cy="4295082"/>
           </a:xfrm>
           <a:prstGeom prst="rect">
             <a:avLst/>
@@ -7245,6 +7261,10 @@
           </p:nvPr>
         </p:nvSpPr>
         <p:spPr>
+          <a:xfrm>
+            <a:off x="311700" y="402494"/>
+            <a:ext cx="2785919" cy="572700"/>
+          </a:xfrm>
           <a:prstGeom prst="rect">
             <a:avLst/>
           </a:prstGeom>
@@ -7337,8 +7357,8 @@
         </p:nvSpPr>
         <p:spPr>
           <a:xfrm>
-            <a:off x="311700" y="445025"/>
-            <a:ext cx="1718100" cy="1559400"/>
+            <a:off x="311700" y="430848"/>
+            <a:ext cx="1629725" cy="1559400"/>
           </a:xfrm>
           <a:prstGeom prst="rect">
             <a:avLst/>

</xml_diff>